<commit_message>
feat: add system architecture with protocol
</commit_message>
<xml_diff>
--- a/General Architecture.pptx
+++ b/General Architecture.pptx
@@ -5,10 +5,11 @@
     <p:sldMasterId id="2147483648" r:id="rId1"/>
   </p:sldMasterIdLst>
   <p:notesMasterIdLst>
-    <p:notesMasterId r:id="rId3"/>
+    <p:notesMasterId r:id="rId4"/>
   </p:notesMasterIdLst>
   <p:sldIdLst>
     <p:sldId id="256" r:id="rId2"/>
+    <p:sldId id="257" r:id="rId3"/>
   </p:sldIdLst>
   <p:sldSz cx="12192000" cy="6858000"/>
   <p:notesSz cx="6858000" cy="9144000"/>
@@ -107,6 +108,14 @@
       </a:defRPr>
     </a:lvl9pPr>
   </p:defaultTextStyle>
+  <p:extLst>
+    <p:ext uri="{EFAFB233-063F-42B5-8137-9DF3F51BA10A}">
+      <p15:sldGuideLst xmlns:p15="http://schemas.microsoft.com/office/powerpoint/2012/main"/>
+    </p:ext>
+    <p:ext uri="{2D200454-40CA-4A62-9FC3-DE9A4176ACB9}">
+      <p15:notesGuideLst xmlns:p15="http://schemas.microsoft.com/office/powerpoint/2012/main"/>
+    </p:ext>
+  </p:extLst>
 </p:presentation>
 </file>
 
@@ -192,7 +201,7 @@
           <a:p>
             <a:fld id="{868DD910-6A72-4410-AA3C-D0D03B0B5661}" type="datetimeFigureOut">
               <a:rPr lang="en-US" smtClean="0"/>
-              <a:t>7/18/2023</a:t>
+              <a:t>7/24/2023</a:t>
             </a:fld>
             <a:endParaRPr lang="en-US"/>
           </a:p>
@@ -548,6 +557,95 @@
 </p:notes>
 </file>
 
+<file path=ppt/notesSlides/notesSlide2.xml><?xml version="1.0" encoding="utf-8"?>
+<p:notes xmlns:a="http://schemas.openxmlformats.org/drawingml/2006/main" xmlns:r="http://schemas.openxmlformats.org/officeDocument/2006/relationships" xmlns:p="http://schemas.openxmlformats.org/presentationml/2006/main">
+  <p:cSld>
+    <p:spTree>
+      <p:nvGrpSpPr>
+        <p:cNvPr id="1" name=""/>
+        <p:cNvGrpSpPr/>
+        <p:nvPr/>
+      </p:nvGrpSpPr>
+      <p:grpSpPr>
+        <a:xfrm>
+          <a:off x="0" y="0"/>
+          <a:ext cx="0" cy="0"/>
+          <a:chOff x="0" y="0"/>
+          <a:chExt cx="0" cy="0"/>
+        </a:xfrm>
+      </p:grpSpPr>
+      <p:sp>
+        <p:nvSpPr>
+          <p:cNvPr id="2" name="Slide Image Placeholder 1"/>
+          <p:cNvSpPr>
+            <a:spLocks noGrp="1" noRot="1" noChangeAspect="1"/>
+          </p:cNvSpPr>
+          <p:nvPr>
+            <p:ph type="sldImg"/>
+          </p:nvPr>
+        </p:nvSpPr>
+        <p:spPr>
+          <a:xfrm>
+            <a:off x="685800" y="1143000"/>
+            <a:ext cx="5486400" cy="3086100"/>
+          </a:xfrm>
+        </p:spPr>
+      </p:sp>
+      <p:sp>
+        <p:nvSpPr>
+          <p:cNvPr id="3" name="Notes Placeholder 2"/>
+          <p:cNvSpPr>
+            <a:spLocks noGrp="1"/>
+          </p:cNvSpPr>
+          <p:nvPr>
+            <p:ph type="body" idx="1"/>
+          </p:nvPr>
+        </p:nvSpPr>
+        <p:spPr/>
+        <p:txBody>
+          <a:bodyPr/>
+          <a:lstStyle/>
+          <a:p>
+            <a:endParaRPr lang="en-US"/>
+          </a:p>
+        </p:txBody>
+      </p:sp>
+      <p:sp>
+        <p:nvSpPr>
+          <p:cNvPr id="4" name="Slide Number Placeholder 3"/>
+          <p:cNvSpPr>
+            <a:spLocks noGrp="1"/>
+          </p:cNvSpPr>
+          <p:nvPr>
+            <p:ph type="sldNum" sz="quarter" idx="5"/>
+          </p:nvPr>
+        </p:nvSpPr>
+        <p:spPr/>
+        <p:txBody>
+          <a:bodyPr/>
+          <a:lstStyle/>
+          <a:p>
+            <a:fld id="{DC9B31B6-CE32-48DE-AE6C-B916E82B2D32}" type="slidenum">
+              <a:rPr lang="en-US" smtClean="0"/>
+              <a:t>2</a:t>
+            </a:fld>
+            <a:endParaRPr lang="en-US"/>
+          </a:p>
+        </p:txBody>
+      </p:sp>
+    </p:spTree>
+    <p:extLst>
+      <p:ext uri="{BB962C8B-B14F-4D97-AF65-F5344CB8AC3E}">
+        <p14:creationId xmlns:p14="http://schemas.microsoft.com/office/powerpoint/2010/main" val="3229685697"/>
+      </p:ext>
+    </p:extLst>
+  </p:cSld>
+  <p:clrMapOvr>
+    <a:masterClrMapping/>
+  </p:clrMapOvr>
+</p:notes>
+</file>
+
 <file path=ppt/slideLayouts/slideLayout1.xml><?xml version="1.0" encoding="utf-8"?>
 <p:sldLayout xmlns:a="http://schemas.openxmlformats.org/drawingml/2006/main" xmlns:r="http://schemas.openxmlformats.org/officeDocument/2006/relationships" xmlns:p="http://schemas.openxmlformats.org/presentationml/2006/main" type="title" preserve="1">
   <p:cSld name="Title Slide">
@@ -695,7 +793,7 @@
           <a:p>
             <a:fld id="{51B6C882-966F-4FDE-B016-98DDBE2D232C}" type="datetimeFigureOut">
               <a:rPr lang="en-US" smtClean="0"/>
-              <a:t>7/18/2023</a:t>
+              <a:t>7/24/2023</a:t>
             </a:fld>
             <a:endParaRPr lang="en-US"/>
           </a:p>
@@ -893,7 +991,7 @@
           <a:p>
             <a:fld id="{51B6C882-966F-4FDE-B016-98DDBE2D232C}" type="datetimeFigureOut">
               <a:rPr lang="en-US" smtClean="0"/>
-              <a:t>7/18/2023</a:t>
+              <a:t>7/24/2023</a:t>
             </a:fld>
             <a:endParaRPr lang="en-US"/>
           </a:p>
@@ -1101,7 +1199,7 @@
           <a:p>
             <a:fld id="{51B6C882-966F-4FDE-B016-98DDBE2D232C}" type="datetimeFigureOut">
               <a:rPr lang="en-US" smtClean="0"/>
-              <a:t>7/18/2023</a:t>
+              <a:t>7/24/2023</a:t>
             </a:fld>
             <a:endParaRPr lang="en-US"/>
           </a:p>
@@ -1299,7 +1397,7 @@
           <a:p>
             <a:fld id="{51B6C882-966F-4FDE-B016-98DDBE2D232C}" type="datetimeFigureOut">
               <a:rPr lang="en-US" smtClean="0"/>
-              <a:t>7/18/2023</a:t>
+              <a:t>7/24/2023</a:t>
             </a:fld>
             <a:endParaRPr lang="en-US"/>
           </a:p>
@@ -1574,7 +1672,7 @@
           <a:p>
             <a:fld id="{51B6C882-966F-4FDE-B016-98DDBE2D232C}" type="datetimeFigureOut">
               <a:rPr lang="en-US" smtClean="0"/>
-              <a:t>7/18/2023</a:t>
+              <a:t>7/24/2023</a:t>
             </a:fld>
             <a:endParaRPr lang="en-US"/>
           </a:p>
@@ -1839,7 +1937,7 @@
           <a:p>
             <a:fld id="{51B6C882-966F-4FDE-B016-98DDBE2D232C}" type="datetimeFigureOut">
               <a:rPr lang="en-US" smtClean="0"/>
-              <a:t>7/18/2023</a:t>
+              <a:t>7/24/2023</a:t>
             </a:fld>
             <a:endParaRPr lang="en-US"/>
           </a:p>
@@ -2251,7 +2349,7 @@
           <a:p>
             <a:fld id="{51B6C882-966F-4FDE-B016-98DDBE2D232C}" type="datetimeFigureOut">
               <a:rPr lang="en-US" smtClean="0"/>
-              <a:t>7/18/2023</a:t>
+              <a:t>7/24/2023</a:t>
             </a:fld>
             <a:endParaRPr lang="en-US"/>
           </a:p>
@@ -2392,7 +2490,7 @@
           <a:p>
             <a:fld id="{51B6C882-966F-4FDE-B016-98DDBE2D232C}" type="datetimeFigureOut">
               <a:rPr lang="en-US" smtClean="0"/>
-              <a:t>7/18/2023</a:t>
+              <a:t>7/24/2023</a:t>
             </a:fld>
             <a:endParaRPr lang="en-US"/>
           </a:p>
@@ -2505,7 +2603,7 @@
           <a:p>
             <a:fld id="{51B6C882-966F-4FDE-B016-98DDBE2D232C}" type="datetimeFigureOut">
               <a:rPr lang="en-US" smtClean="0"/>
-              <a:t>7/18/2023</a:t>
+              <a:t>7/24/2023</a:t>
             </a:fld>
             <a:endParaRPr lang="en-US"/>
           </a:p>
@@ -2816,7 +2914,7 @@
           <a:p>
             <a:fld id="{51B6C882-966F-4FDE-B016-98DDBE2D232C}" type="datetimeFigureOut">
               <a:rPr lang="en-US" smtClean="0"/>
-              <a:t>7/18/2023</a:t>
+              <a:t>7/24/2023</a:t>
             </a:fld>
             <a:endParaRPr lang="en-US"/>
           </a:p>
@@ -3104,7 +3202,7 @@
           <a:p>
             <a:fld id="{51B6C882-966F-4FDE-B016-98DDBE2D232C}" type="datetimeFigureOut">
               <a:rPr lang="en-US" smtClean="0"/>
-              <a:t>7/18/2023</a:t>
+              <a:t>7/24/2023</a:t>
             </a:fld>
             <a:endParaRPr lang="en-US"/>
           </a:p>
@@ -3345,7 +3443,7 @@
           <a:p>
             <a:fld id="{51B6C882-966F-4FDE-B016-98DDBE2D232C}" type="datetimeFigureOut">
               <a:rPr lang="en-US" smtClean="0"/>
-              <a:t>7/18/2023</a:t>
+              <a:t>7/24/2023</a:t>
             </a:fld>
             <a:endParaRPr lang="en-US"/>
           </a:p>
@@ -4152,6 +4250,1072 @@
     <p:extLst>
       <p:ext uri="{BB962C8B-B14F-4D97-AF65-F5344CB8AC3E}">
         <p14:creationId xmlns:p14="http://schemas.microsoft.com/office/powerpoint/2010/main" val="279475517"/>
+      </p:ext>
+    </p:extLst>
+  </p:cSld>
+  <p:clrMapOvr>
+    <a:masterClrMapping/>
+  </p:clrMapOvr>
+</p:sld>
+</file>
+
+<file path=ppt/slides/slide2.xml><?xml version="1.0" encoding="utf-8"?>
+<p:sld xmlns:a="http://schemas.openxmlformats.org/drawingml/2006/main" xmlns:r="http://schemas.openxmlformats.org/officeDocument/2006/relationships" xmlns:p="http://schemas.openxmlformats.org/presentationml/2006/main">
+  <p:cSld>
+    <p:spTree>
+      <p:nvGrpSpPr>
+        <p:cNvPr id="1" name=""/>
+        <p:cNvGrpSpPr/>
+        <p:nvPr/>
+      </p:nvGrpSpPr>
+      <p:grpSpPr>
+        <a:xfrm>
+          <a:off x="0" y="0"/>
+          <a:ext cx="0" cy="0"/>
+          <a:chOff x="0" y="0"/>
+          <a:chExt cx="0" cy="0"/>
+        </a:xfrm>
+      </p:grpSpPr>
+      <p:pic>
+        <p:nvPicPr>
+          <p:cNvPr id="5" name="Graphic 4" descr="Server outline">
+            <a:extLst>
+              <a:ext uri="{FF2B5EF4-FFF2-40B4-BE49-F238E27FC236}">
+                <a16:creationId xmlns:a16="http://schemas.microsoft.com/office/drawing/2014/main" id="{538D2996-01D8-9F02-D4DB-2779CE44381F}"/>
+              </a:ext>
+            </a:extLst>
+          </p:cNvPr>
+          <p:cNvPicPr>
+            <a:picLocks noChangeAspect="1"/>
+          </p:cNvPicPr>
+          <p:nvPr/>
+        </p:nvPicPr>
+        <p:blipFill>
+          <a:blip r:embed="rId3">
+            <a:extLst>
+              <a:ext uri="{28A0092B-C50C-407E-A947-70E740481C1C}">
+                <a14:useLocalDpi xmlns:a14="http://schemas.microsoft.com/office/drawing/2010/main" val="0"/>
+              </a:ext>
+              <a:ext uri="{96DAC541-7B7A-43D3-8B79-37D633B846F1}">
+                <asvg:svgBlip xmlns:asvg="http://schemas.microsoft.com/office/drawing/2016/SVG/main" r:embed="rId4"/>
+              </a:ext>
+            </a:extLst>
+          </a:blip>
+          <a:stretch>
+            <a:fillRect/>
+          </a:stretch>
+        </p:blipFill>
+        <p:spPr>
+          <a:xfrm>
+            <a:off x="4857107" y="1302178"/>
+            <a:ext cx="2125980" cy="2125980"/>
+          </a:xfrm>
+          <a:prstGeom prst="rect">
+            <a:avLst/>
+          </a:prstGeom>
+        </p:spPr>
+      </p:pic>
+      <p:pic>
+        <p:nvPicPr>
+          <p:cNvPr id="7" name="Graphic 6" descr="Smart Phone outline">
+            <a:extLst>
+              <a:ext uri="{FF2B5EF4-FFF2-40B4-BE49-F238E27FC236}">
+                <a16:creationId xmlns:a16="http://schemas.microsoft.com/office/drawing/2014/main" id="{4E661C6B-5022-BE20-6523-2E9F2E06365B}"/>
+              </a:ext>
+            </a:extLst>
+          </p:cNvPr>
+          <p:cNvPicPr>
+            <a:picLocks noChangeAspect="1"/>
+          </p:cNvPicPr>
+          <p:nvPr/>
+        </p:nvPicPr>
+        <p:blipFill>
+          <a:blip r:embed="rId5">
+            <a:extLst>
+              <a:ext uri="{28A0092B-C50C-407E-A947-70E740481C1C}">
+                <a14:useLocalDpi xmlns:a14="http://schemas.microsoft.com/office/drawing/2010/main" val="0"/>
+              </a:ext>
+              <a:ext uri="{96DAC541-7B7A-43D3-8B79-37D633B846F1}">
+                <asvg:svgBlip xmlns:asvg="http://schemas.microsoft.com/office/drawing/2016/SVG/main" r:embed="rId6"/>
+              </a:ext>
+            </a:extLst>
+          </a:blip>
+          <a:stretch>
+            <a:fillRect/>
+          </a:stretch>
+        </p:blipFill>
+        <p:spPr>
+          <a:xfrm>
+            <a:off x="9783289" y="4042282"/>
+            <a:ext cx="1813560" cy="1813560"/>
+          </a:xfrm>
+          <a:prstGeom prst="rect">
+            <a:avLst/>
+          </a:prstGeom>
+        </p:spPr>
+      </p:pic>
+      <p:cxnSp>
+        <p:nvCxnSpPr>
+          <p:cNvPr id="9" name="Straight Arrow Connector 8">
+            <a:extLst>
+              <a:ext uri="{FF2B5EF4-FFF2-40B4-BE49-F238E27FC236}">
+                <a16:creationId xmlns:a16="http://schemas.microsoft.com/office/drawing/2014/main" id="{B00C4266-DD76-1170-8B6D-8E42023F3C8C}"/>
+              </a:ext>
+            </a:extLst>
+          </p:cNvPr>
+          <p:cNvCxnSpPr>
+            <a:cxnSpLocks/>
+          </p:cNvCxnSpPr>
+          <p:nvPr/>
+        </p:nvCxnSpPr>
+        <p:spPr>
+          <a:xfrm>
+            <a:off x="6952700" y="2574607"/>
+            <a:ext cx="3028480" cy="1708785"/>
+          </a:xfrm>
+          <a:prstGeom prst="straightConnector1">
+            <a:avLst/>
+          </a:prstGeom>
+          <a:ln>
+            <a:tailEnd type="triangle"/>
+          </a:ln>
+        </p:spPr>
+        <p:style>
+          <a:lnRef idx="3">
+            <a:schemeClr val="dk1"/>
+          </a:lnRef>
+          <a:fillRef idx="0">
+            <a:schemeClr val="dk1"/>
+          </a:fillRef>
+          <a:effectRef idx="2">
+            <a:schemeClr val="dk1"/>
+          </a:effectRef>
+          <a:fontRef idx="minor">
+            <a:schemeClr val="tx1"/>
+          </a:fontRef>
+        </p:style>
+      </p:cxnSp>
+      <p:cxnSp>
+        <p:nvCxnSpPr>
+          <p:cNvPr id="10" name="Straight Arrow Connector 9">
+            <a:extLst>
+              <a:ext uri="{FF2B5EF4-FFF2-40B4-BE49-F238E27FC236}">
+                <a16:creationId xmlns:a16="http://schemas.microsoft.com/office/drawing/2014/main" id="{045D28BC-93B0-6E23-A345-3BA428D84BD6}"/>
+              </a:ext>
+            </a:extLst>
+          </p:cNvPr>
+          <p:cNvCxnSpPr>
+            <a:cxnSpLocks/>
+          </p:cNvCxnSpPr>
+          <p:nvPr/>
+        </p:nvCxnSpPr>
+        <p:spPr>
+          <a:xfrm flipH="1" flipV="1">
+            <a:off x="7073244" y="2323750"/>
+            <a:ext cx="2996968" cy="1736027"/>
+          </a:xfrm>
+          <a:prstGeom prst="straightConnector1">
+            <a:avLst/>
+          </a:prstGeom>
+          <a:ln>
+            <a:tailEnd type="triangle"/>
+          </a:ln>
+        </p:spPr>
+        <p:style>
+          <a:lnRef idx="3">
+            <a:schemeClr val="dk1"/>
+          </a:lnRef>
+          <a:fillRef idx="0">
+            <a:schemeClr val="dk1"/>
+          </a:fillRef>
+          <a:effectRef idx="2">
+            <a:schemeClr val="dk1"/>
+          </a:effectRef>
+          <a:fontRef idx="minor">
+            <a:schemeClr val="tx1"/>
+          </a:fontRef>
+        </p:style>
+      </p:cxnSp>
+      <p:pic>
+        <p:nvPicPr>
+          <p:cNvPr id="17" name="Graphic 16" descr="Robot outline">
+            <a:extLst>
+              <a:ext uri="{FF2B5EF4-FFF2-40B4-BE49-F238E27FC236}">
+                <a16:creationId xmlns:a16="http://schemas.microsoft.com/office/drawing/2014/main" id="{930336B6-C5E9-F0E3-0EB9-91E577F5A8B7}"/>
+              </a:ext>
+            </a:extLst>
+          </p:cNvPr>
+          <p:cNvPicPr>
+            <a:picLocks noChangeAspect="1"/>
+          </p:cNvPicPr>
+          <p:nvPr/>
+        </p:nvPicPr>
+        <p:blipFill>
+          <a:blip r:embed="rId7">
+            <a:extLst>
+              <a:ext uri="{28A0092B-C50C-407E-A947-70E740481C1C}">
+                <a14:useLocalDpi xmlns:a14="http://schemas.microsoft.com/office/drawing/2010/main" val="0"/>
+              </a:ext>
+              <a:ext uri="{96DAC541-7B7A-43D3-8B79-37D633B846F1}">
+                <asvg:svgBlip xmlns:asvg="http://schemas.microsoft.com/office/drawing/2016/SVG/main" r:embed="rId8"/>
+              </a:ext>
+            </a:extLst>
+          </a:blip>
+          <a:stretch>
+            <a:fillRect/>
+          </a:stretch>
+        </p:blipFill>
+        <p:spPr>
+          <a:xfrm>
+            <a:off x="595151" y="3844164"/>
+            <a:ext cx="1995181" cy="1995181"/>
+          </a:xfrm>
+          <a:prstGeom prst="rect">
+            <a:avLst/>
+          </a:prstGeom>
+        </p:spPr>
+      </p:pic>
+      <p:cxnSp>
+        <p:nvCxnSpPr>
+          <p:cNvPr id="20" name="Straight Arrow Connector 19">
+            <a:extLst>
+              <a:ext uri="{FF2B5EF4-FFF2-40B4-BE49-F238E27FC236}">
+                <a16:creationId xmlns:a16="http://schemas.microsoft.com/office/drawing/2014/main" id="{E8CE2894-9FE0-8CDB-1C69-B52722B4FA01}"/>
+              </a:ext>
+            </a:extLst>
+          </p:cNvPr>
+          <p:cNvCxnSpPr>
+            <a:cxnSpLocks/>
+          </p:cNvCxnSpPr>
+          <p:nvPr/>
+        </p:nvCxnSpPr>
+        <p:spPr>
+          <a:xfrm flipH="1">
+            <a:off x="2223083" y="2534594"/>
+            <a:ext cx="2754568" cy="1734765"/>
+          </a:xfrm>
+          <a:prstGeom prst="straightConnector1">
+            <a:avLst/>
+          </a:prstGeom>
+          <a:ln>
+            <a:tailEnd type="triangle"/>
+          </a:ln>
+        </p:spPr>
+        <p:style>
+          <a:lnRef idx="3">
+            <a:schemeClr val="dk1"/>
+          </a:lnRef>
+          <a:fillRef idx="0">
+            <a:schemeClr val="dk1"/>
+          </a:fillRef>
+          <a:effectRef idx="2">
+            <a:schemeClr val="dk1"/>
+          </a:effectRef>
+          <a:fontRef idx="minor">
+            <a:schemeClr val="tx1"/>
+          </a:fontRef>
+        </p:style>
+      </p:cxnSp>
+      <p:cxnSp>
+        <p:nvCxnSpPr>
+          <p:cNvPr id="21" name="Straight Arrow Connector 20">
+            <a:extLst>
+              <a:ext uri="{FF2B5EF4-FFF2-40B4-BE49-F238E27FC236}">
+                <a16:creationId xmlns:a16="http://schemas.microsoft.com/office/drawing/2014/main" id="{28717979-09AE-CEB1-D495-1130E34D42E0}"/>
+              </a:ext>
+            </a:extLst>
+          </p:cNvPr>
+          <p:cNvCxnSpPr>
+            <a:cxnSpLocks/>
+          </p:cNvCxnSpPr>
+          <p:nvPr/>
+        </p:nvCxnSpPr>
+        <p:spPr>
+          <a:xfrm flipV="1">
+            <a:off x="2094870" y="2323750"/>
+            <a:ext cx="2762237" cy="1686909"/>
+          </a:xfrm>
+          <a:prstGeom prst="straightConnector1">
+            <a:avLst/>
+          </a:prstGeom>
+          <a:ln>
+            <a:tailEnd type="triangle"/>
+          </a:ln>
+        </p:spPr>
+        <p:style>
+          <a:lnRef idx="3">
+            <a:schemeClr val="dk1"/>
+          </a:lnRef>
+          <a:fillRef idx="0">
+            <a:schemeClr val="dk1"/>
+          </a:fillRef>
+          <a:effectRef idx="2">
+            <a:schemeClr val="dk1"/>
+          </a:effectRef>
+          <a:fontRef idx="minor">
+            <a:schemeClr val="tx1"/>
+          </a:fontRef>
+        </p:style>
+      </p:cxnSp>
+      <p:sp>
+        <p:nvSpPr>
+          <p:cNvPr id="34" name="TextBox 33">
+            <a:extLst>
+              <a:ext uri="{FF2B5EF4-FFF2-40B4-BE49-F238E27FC236}">
+                <a16:creationId xmlns:a16="http://schemas.microsoft.com/office/drawing/2014/main" id="{2BBCA599-41A3-05FF-28F8-4D4B0D4A76AE}"/>
+              </a:ext>
+            </a:extLst>
+          </p:cNvPr>
+          <p:cNvSpPr txBox="1"/>
+          <p:nvPr/>
+        </p:nvSpPr>
+        <p:spPr>
+          <a:xfrm>
+            <a:off x="5412073" y="3197325"/>
+            <a:ext cx="1062599" cy="461665"/>
+          </a:xfrm>
+          <a:prstGeom prst="rect">
+            <a:avLst/>
+          </a:prstGeom>
+          <a:noFill/>
+        </p:spPr>
+        <p:txBody>
+          <a:bodyPr wrap="square" rtlCol="0">
+            <a:spAutoFit/>
+          </a:bodyPr>
+          <a:lstStyle/>
+          <a:p>
+            <a:r>
+              <a:rPr lang="en-US" sz="2400" b="1" dirty="0"/>
+              <a:t>Server</a:t>
+            </a:r>
+          </a:p>
+        </p:txBody>
+      </p:sp>
+      <p:sp>
+        <p:nvSpPr>
+          <p:cNvPr id="35" name="TextBox 34">
+            <a:extLst>
+              <a:ext uri="{FF2B5EF4-FFF2-40B4-BE49-F238E27FC236}">
+                <a16:creationId xmlns:a16="http://schemas.microsoft.com/office/drawing/2014/main" id="{5B561D32-A5E9-AF20-FD28-2B2A2A1A6562}"/>
+              </a:ext>
+            </a:extLst>
+          </p:cNvPr>
+          <p:cNvSpPr txBox="1"/>
+          <p:nvPr/>
+        </p:nvSpPr>
+        <p:spPr>
+          <a:xfrm>
+            <a:off x="1115174" y="5742179"/>
+            <a:ext cx="1014552" cy="461665"/>
+          </a:xfrm>
+          <a:prstGeom prst="rect">
+            <a:avLst/>
+          </a:prstGeom>
+          <a:noFill/>
+        </p:spPr>
+        <p:txBody>
+          <a:bodyPr wrap="square" rtlCol="0">
+            <a:spAutoFit/>
+          </a:bodyPr>
+          <a:lstStyle/>
+          <a:p>
+            <a:r>
+              <a:rPr lang="en-US" sz="2400" b="1" dirty="0"/>
+              <a:t>Robot</a:t>
+            </a:r>
+          </a:p>
+        </p:txBody>
+      </p:sp>
+      <p:sp>
+        <p:nvSpPr>
+          <p:cNvPr id="36" name="TextBox 35">
+            <a:extLst>
+              <a:ext uri="{FF2B5EF4-FFF2-40B4-BE49-F238E27FC236}">
+                <a16:creationId xmlns:a16="http://schemas.microsoft.com/office/drawing/2014/main" id="{A8E3FBAC-1F01-952A-BF5C-351BEDEB902A}"/>
+              </a:ext>
+            </a:extLst>
+          </p:cNvPr>
+          <p:cNvSpPr txBox="1"/>
+          <p:nvPr/>
+        </p:nvSpPr>
+        <p:spPr>
+          <a:xfrm>
+            <a:off x="10339652" y="5742179"/>
+            <a:ext cx="761320" cy="461665"/>
+          </a:xfrm>
+          <a:prstGeom prst="rect">
+            <a:avLst/>
+          </a:prstGeom>
+          <a:noFill/>
+        </p:spPr>
+        <p:txBody>
+          <a:bodyPr wrap="square" rtlCol="0">
+            <a:spAutoFit/>
+          </a:bodyPr>
+          <a:lstStyle/>
+          <a:p>
+            <a:r>
+              <a:rPr lang="en-US" sz="2400" b="1" dirty="0"/>
+              <a:t>App</a:t>
+            </a:r>
+          </a:p>
+        </p:txBody>
+      </p:sp>
+      <p:sp>
+        <p:nvSpPr>
+          <p:cNvPr id="8" name="TextBox 7">
+            <a:extLst>
+              <a:ext uri="{FF2B5EF4-FFF2-40B4-BE49-F238E27FC236}">
+                <a16:creationId xmlns:a16="http://schemas.microsoft.com/office/drawing/2014/main" id="{CC2931A9-55BD-A47B-84C6-55B023345DFC}"/>
+              </a:ext>
+            </a:extLst>
+          </p:cNvPr>
+          <p:cNvSpPr txBox="1"/>
+          <p:nvPr/>
+        </p:nvSpPr>
+        <p:spPr>
+          <a:xfrm rot="1821786">
+            <a:off x="8028642" y="2947507"/>
+            <a:ext cx="1487651" cy="369332"/>
+          </a:xfrm>
+          <a:prstGeom prst="rect">
+            <a:avLst/>
+          </a:prstGeom>
+          <a:noFill/>
+        </p:spPr>
+        <p:txBody>
+          <a:bodyPr wrap="none" rtlCol="0">
+            <a:spAutoFit/>
+          </a:bodyPr>
+          <a:lstStyle/>
+          <a:p>
+            <a:r>
+              <a:rPr lang="en-US" dirty="0"/>
+              <a:t>HTTP Request</a:t>
+            </a:r>
+          </a:p>
+        </p:txBody>
+      </p:sp>
+      <p:sp>
+        <p:nvSpPr>
+          <p:cNvPr id="11" name="TextBox 10">
+            <a:extLst>
+              <a:ext uri="{FF2B5EF4-FFF2-40B4-BE49-F238E27FC236}">
+                <a16:creationId xmlns:a16="http://schemas.microsoft.com/office/drawing/2014/main" id="{CDB4EB08-503D-0701-DEBE-21990D6E4833}"/>
+              </a:ext>
+            </a:extLst>
+          </p:cNvPr>
+          <p:cNvSpPr txBox="1"/>
+          <p:nvPr/>
+        </p:nvSpPr>
+        <p:spPr>
+          <a:xfrm rot="1821786">
+            <a:off x="7887505" y="3365440"/>
+            <a:ext cx="1081515" cy="369332"/>
+          </a:xfrm>
+          <a:prstGeom prst="rect">
+            <a:avLst/>
+          </a:prstGeom>
+          <a:noFill/>
+        </p:spPr>
+        <p:txBody>
+          <a:bodyPr wrap="none" rtlCol="0">
+            <a:spAutoFit/>
+          </a:bodyPr>
+          <a:lstStyle/>
+          <a:p>
+            <a:r>
+              <a:rPr lang="en-US" dirty="0"/>
+              <a:t>Response</a:t>
+            </a:r>
+          </a:p>
+        </p:txBody>
+      </p:sp>
+      <p:sp>
+        <p:nvSpPr>
+          <p:cNvPr id="12" name="Cloud 11">
+            <a:extLst>
+              <a:ext uri="{FF2B5EF4-FFF2-40B4-BE49-F238E27FC236}">
+                <a16:creationId xmlns:a16="http://schemas.microsoft.com/office/drawing/2014/main" id="{DB4AC02F-A405-9AD4-6C56-7159656998F1}"/>
+              </a:ext>
+            </a:extLst>
+          </p:cNvPr>
+          <p:cNvSpPr/>
+          <p:nvPr/>
+        </p:nvSpPr>
+        <p:spPr>
+          <a:xfrm>
+            <a:off x="1093565" y="593840"/>
+            <a:ext cx="2259036" cy="1506006"/>
+          </a:xfrm>
+          <a:prstGeom prst="cloud">
+            <a:avLst/>
+          </a:prstGeom>
+          <a:ln w="38100"/>
+        </p:spPr>
+        <p:style>
+          <a:lnRef idx="2">
+            <a:schemeClr val="accent1"/>
+          </a:lnRef>
+          <a:fillRef idx="1">
+            <a:schemeClr val="lt1"/>
+          </a:fillRef>
+          <a:effectRef idx="0">
+            <a:schemeClr val="accent1"/>
+          </a:effectRef>
+          <a:fontRef idx="minor">
+            <a:schemeClr val="dk1"/>
+          </a:fontRef>
+        </p:style>
+        <p:txBody>
+          <a:bodyPr rtlCol="0" anchor="ctr"/>
+          <a:lstStyle/>
+          <a:p>
+            <a:pPr algn="ctr"/>
+            <a:r>
+              <a:rPr lang="en-US" sz="2400" dirty="0"/>
+              <a:t>Azure IoT Hub</a:t>
+            </a:r>
+          </a:p>
+        </p:txBody>
+      </p:sp>
+      <p:pic>
+        <p:nvPicPr>
+          <p:cNvPr id="14" name="Graphic 13" descr="Cloud outline">
+            <a:extLst>
+              <a:ext uri="{FF2B5EF4-FFF2-40B4-BE49-F238E27FC236}">
+                <a16:creationId xmlns:a16="http://schemas.microsoft.com/office/drawing/2014/main" id="{EB27FC52-9B96-8A30-5003-D16D644D73B7}"/>
+              </a:ext>
+            </a:extLst>
+          </p:cNvPr>
+          <p:cNvPicPr>
+            <a:picLocks noChangeAspect="1"/>
+          </p:cNvPicPr>
+          <p:nvPr/>
+        </p:nvPicPr>
+        <p:blipFill>
+          <a:blip r:embed="rId9">
+            <a:extLst>
+              <a:ext uri="{28A0092B-C50C-407E-A947-70E740481C1C}">
+                <a14:useLocalDpi xmlns:a14="http://schemas.microsoft.com/office/drawing/2010/main" val="0"/>
+              </a:ext>
+              <a:ext uri="{96DAC541-7B7A-43D3-8B79-37D633B846F1}">
+                <asvg:svgBlip xmlns:asvg="http://schemas.microsoft.com/office/drawing/2016/SVG/main" r:embed="rId10"/>
+              </a:ext>
+            </a:extLst>
+          </a:blip>
+          <a:stretch>
+            <a:fillRect/>
+          </a:stretch>
+        </p:blipFill>
+        <p:spPr>
+          <a:xfrm>
+            <a:off x="8576158" y="-350801"/>
+            <a:ext cx="2414261" cy="2414261"/>
+          </a:xfrm>
+          <a:prstGeom prst="rect">
+            <a:avLst/>
+          </a:prstGeom>
+        </p:spPr>
+      </p:pic>
+      <p:sp>
+        <p:nvSpPr>
+          <p:cNvPr id="15" name="TextBox 14">
+            <a:extLst>
+              <a:ext uri="{FF2B5EF4-FFF2-40B4-BE49-F238E27FC236}">
+                <a16:creationId xmlns:a16="http://schemas.microsoft.com/office/drawing/2014/main" id="{9A894A66-4535-D81F-6B1B-ADAAC1971C0F}"/>
+              </a:ext>
+            </a:extLst>
+          </p:cNvPr>
+          <p:cNvSpPr txBox="1"/>
+          <p:nvPr/>
+        </p:nvSpPr>
+        <p:spPr>
+          <a:xfrm>
+            <a:off x="8861893" y="777403"/>
+            <a:ext cx="1632637" cy="646331"/>
+          </a:xfrm>
+          <a:prstGeom prst="rect">
+            <a:avLst/>
+          </a:prstGeom>
+          <a:noFill/>
+        </p:spPr>
+        <p:txBody>
+          <a:bodyPr wrap="square" rtlCol="0">
+            <a:spAutoFit/>
+          </a:bodyPr>
+          <a:lstStyle/>
+          <a:p>
+            <a:pPr algn="ctr"/>
+            <a:r>
+              <a:rPr lang="en-US" dirty="0"/>
+              <a:t>Firebase Cloud Messaging</a:t>
+            </a:r>
+          </a:p>
+        </p:txBody>
+      </p:sp>
+      <p:cxnSp>
+        <p:nvCxnSpPr>
+          <p:cNvPr id="30" name="Straight Arrow Connector 29">
+            <a:extLst>
+              <a:ext uri="{FF2B5EF4-FFF2-40B4-BE49-F238E27FC236}">
+                <a16:creationId xmlns:a16="http://schemas.microsoft.com/office/drawing/2014/main" id="{CE6484C8-2B4A-E723-6AA1-FF3AC114DD1C}"/>
+              </a:ext>
+            </a:extLst>
+          </p:cNvPr>
+          <p:cNvCxnSpPr/>
+          <p:nvPr/>
+        </p:nvCxnSpPr>
+        <p:spPr>
+          <a:xfrm>
+            <a:off x="1813560" y="2063460"/>
+            <a:ext cx="0" cy="1780704"/>
+          </a:xfrm>
+          <a:prstGeom prst="straightConnector1">
+            <a:avLst/>
+          </a:prstGeom>
+          <a:ln w="28575">
+            <a:tailEnd type="triangle"/>
+          </a:ln>
+        </p:spPr>
+        <p:style>
+          <a:lnRef idx="1">
+            <a:schemeClr val="dk1"/>
+          </a:lnRef>
+          <a:fillRef idx="0">
+            <a:schemeClr val="dk1"/>
+          </a:fillRef>
+          <a:effectRef idx="0">
+            <a:schemeClr val="dk1"/>
+          </a:effectRef>
+          <a:fontRef idx="minor">
+            <a:schemeClr val="tx1"/>
+          </a:fontRef>
+        </p:style>
+      </p:cxnSp>
+      <p:cxnSp>
+        <p:nvCxnSpPr>
+          <p:cNvPr id="32" name="Straight Arrow Connector 31">
+            <a:extLst>
+              <a:ext uri="{FF2B5EF4-FFF2-40B4-BE49-F238E27FC236}">
+                <a16:creationId xmlns:a16="http://schemas.microsoft.com/office/drawing/2014/main" id="{44DD5133-3A5C-A62D-D4F1-9B1E7B18CC5F}"/>
+              </a:ext>
+            </a:extLst>
+          </p:cNvPr>
+          <p:cNvCxnSpPr>
+            <a:cxnSpLocks/>
+          </p:cNvCxnSpPr>
+          <p:nvPr/>
+        </p:nvCxnSpPr>
+        <p:spPr>
+          <a:xfrm flipV="1">
+            <a:off x="1480981" y="2038060"/>
+            <a:ext cx="0" cy="1806104"/>
+          </a:xfrm>
+          <a:prstGeom prst="straightConnector1">
+            <a:avLst/>
+          </a:prstGeom>
+          <a:ln w="28575">
+            <a:tailEnd type="triangle"/>
+          </a:ln>
+        </p:spPr>
+        <p:style>
+          <a:lnRef idx="1">
+            <a:schemeClr val="dk1"/>
+          </a:lnRef>
+          <a:fillRef idx="0">
+            <a:schemeClr val="dk1"/>
+          </a:fillRef>
+          <a:effectRef idx="0">
+            <a:schemeClr val="dk1"/>
+          </a:effectRef>
+          <a:fontRef idx="minor">
+            <a:schemeClr val="tx1"/>
+          </a:fontRef>
+        </p:style>
+      </p:cxnSp>
+      <p:sp>
+        <p:nvSpPr>
+          <p:cNvPr id="39" name="TextBox 38">
+            <a:extLst>
+              <a:ext uri="{FF2B5EF4-FFF2-40B4-BE49-F238E27FC236}">
+                <a16:creationId xmlns:a16="http://schemas.microsoft.com/office/drawing/2014/main" id="{3B7CAD45-6075-4F1B-FF89-191EABB2C09A}"/>
+              </a:ext>
+            </a:extLst>
+          </p:cNvPr>
+          <p:cNvSpPr txBox="1"/>
+          <p:nvPr/>
+        </p:nvSpPr>
+        <p:spPr>
+          <a:xfrm rot="19685774">
+            <a:off x="2669615" y="2870196"/>
+            <a:ext cx="1487651" cy="369332"/>
+          </a:xfrm>
+          <a:prstGeom prst="rect">
+            <a:avLst/>
+          </a:prstGeom>
+          <a:noFill/>
+        </p:spPr>
+        <p:txBody>
+          <a:bodyPr wrap="none" rtlCol="0">
+            <a:spAutoFit/>
+          </a:bodyPr>
+          <a:lstStyle/>
+          <a:p>
+            <a:r>
+              <a:rPr lang="en-US" dirty="0"/>
+              <a:t>HTTP Request</a:t>
+            </a:r>
+          </a:p>
+        </p:txBody>
+      </p:sp>
+      <p:sp>
+        <p:nvSpPr>
+          <p:cNvPr id="40" name="TextBox 39">
+            <a:extLst>
+              <a:ext uri="{FF2B5EF4-FFF2-40B4-BE49-F238E27FC236}">
+                <a16:creationId xmlns:a16="http://schemas.microsoft.com/office/drawing/2014/main" id="{2DBD83BD-A249-DD76-B26A-C30FCB6460C4}"/>
+              </a:ext>
+            </a:extLst>
+          </p:cNvPr>
+          <p:cNvSpPr txBox="1"/>
+          <p:nvPr/>
+        </p:nvSpPr>
+        <p:spPr>
+          <a:xfrm rot="19568024">
+            <a:off x="3128772" y="3297930"/>
+            <a:ext cx="1081515" cy="369332"/>
+          </a:xfrm>
+          <a:prstGeom prst="rect">
+            <a:avLst/>
+          </a:prstGeom>
+          <a:noFill/>
+        </p:spPr>
+        <p:txBody>
+          <a:bodyPr wrap="none" rtlCol="0">
+            <a:spAutoFit/>
+          </a:bodyPr>
+          <a:lstStyle/>
+          <a:p>
+            <a:r>
+              <a:rPr lang="en-US" dirty="0"/>
+              <a:t>Response</a:t>
+            </a:r>
+          </a:p>
+        </p:txBody>
+      </p:sp>
+      <p:sp>
+        <p:nvSpPr>
+          <p:cNvPr id="41" name="TextBox 40">
+            <a:extLst>
+              <a:ext uri="{FF2B5EF4-FFF2-40B4-BE49-F238E27FC236}">
+                <a16:creationId xmlns:a16="http://schemas.microsoft.com/office/drawing/2014/main" id="{FDA1FD62-8C5B-7C57-8C63-B225ECCB3898}"/>
+              </a:ext>
+            </a:extLst>
+          </p:cNvPr>
+          <p:cNvSpPr txBox="1"/>
+          <p:nvPr/>
+        </p:nvSpPr>
+        <p:spPr>
+          <a:xfrm rot="16200000">
+            <a:off x="602299" y="2734676"/>
+            <a:ext cx="1492140" cy="369332"/>
+          </a:xfrm>
+          <a:prstGeom prst="rect">
+            <a:avLst/>
+          </a:prstGeom>
+          <a:noFill/>
+        </p:spPr>
+        <p:txBody>
+          <a:bodyPr wrap="none" rtlCol="0">
+            <a:spAutoFit/>
+          </a:bodyPr>
+          <a:lstStyle/>
+          <a:p>
+            <a:r>
+              <a:rPr lang="en-US" dirty="0"/>
+              <a:t>MQTT Publish</a:t>
+            </a:r>
+          </a:p>
+        </p:txBody>
+      </p:sp>
+      <p:cxnSp>
+        <p:nvCxnSpPr>
+          <p:cNvPr id="43" name="Straight Arrow Connector 42">
+            <a:extLst>
+              <a:ext uri="{FF2B5EF4-FFF2-40B4-BE49-F238E27FC236}">
+                <a16:creationId xmlns:a16="http://schemas.microsoft.com/office/drawing/2014/main" id="{099B8569-6DD2-D88B-C4D8-C4CA23F51BF7}"/>
+              </a:ext>
+            </a:extLst>
+          </p:cNvPr>
+          <p:cNvCxnSpPr/>
+          <p:nvPr/>
+        </p:nvCxnSpPr>
+        <p:spPr>
+          <a:xfrm>
+            <a:off x="3413440" y="1023457"/>
+            <a:ext cx="1687066" cy="595618"/>
+          </a:xfrm>
+          <a:prstGeom prst="straightConnector1">
+            <a:avLst/>
+          </a:prstGeom>
+          <a:ln w="28575">
+            <a:tailEnd type="triangle"/>
+          </a:ln>
+        </p:spPr>
+        <p:style>
+          <a:lnRef idx="1">
+            <a:schemeClr val="dk1"/>
+          </a:lnRef>
+          <a:fillRef idx="0">
+            <a:schemeClr val="dk1"/>
+          </a:fillRef>
+          <a:effectRef idx="0">
+            <a:schemeClr val="dk1"/>
+          </a:effectRef>
+          <a:fontRef idx="minor">
+            <a:schemeClr val="tx1"/>
+          </a:fontRef>
+        </p:style>
+      </p:cxnSp>
+      <p:cxnSp>
+        <p:nvCxnSpPr>
+          <p:cNvPr id="45" name="Straight Arrow Connector 44">
+            <a:extLst>
+              <a:ext uri="{FF2B5EF4-FFF2-40B4-BE49-F238E27FC236}">
+                <a16:creationId xmlns:a16="http://schemas.microsoft.com/office/drawing/2014/main" id="{B8D4C712-DE23-DC0A-0090-A2B6B17AB8F1}"/>
+              </a:ext>
+            </a:extLst>
+          </p:cNvPr>
+          <p:cNvCxnSpPr>
+            <a:cxnSpLocks/>
+          </p:cNvCxnSpPr>
+          <p:nvPr/>
+        </p:nvCxnSpPr>
+        <p:spPr>
+          <a:xfrm flipH="1" flipV="1">
+            <a:off x="3413440" y="1350685"/>
+            <a:ext cx="1564211" cy="567146"/>
+          </a:xfrm>
+          <a:prstGeom prst="straightConnector1">
+            <a:avLst/>
+          </a:prstGeom>
+          <a:ln w="28575">
+            <a:tailEnd type="triangle"/>
+          </a:ln>
+        </p:spPr>
+        <p:style>
+          <a:lnRef idx="1">
+            <a:schemeClr val="dk1"/>
+          </a:lnRef>
+          <a:fillRef idx="0">
+            <a:schemeClr val="dk1"/>
+          </a:fillRef>
+          <a:effectRef idx="0">
+            <a:schemeClr val="dk1"/>
+          </a:effectRef>
+          <a:fontRef idx="minor">
+            <a:schemeClr val="tx1"/>
+          </a:fontRef>
+        </p:style>
+      </p:cxnSp>
+      <p:sp>
+        <p:nvSpPr>
+          <p:cNvPr id="47" name="TextBox 46">
+            <a:extLst>
+              <a:ext uri="{FF2B5EF4-FFF2-40B4-BE49-F238E27FC236}">
+                <a16:creationId xmlns:a16="http://schemas.microsoft.com/office/drawing/2014/main" id="{65AC299F-6A9D-9952-835D-54F1F05E3F4C}"/>
+              </a:ext>
+            </a:extLst>
+          </p:cNvPr>
+          <p:cNvSpPr txBox="1"/>
+          <p:nvPr/>
+        </p:nvSpPr>
+        <p:spPr>
+          <a:xfrm rot="1170857">
+            <a:off x="3512514" y="1003251"/>
+            <a:ext cx="1629998" cy="369332"/>
+          </a:xfrm>
+          <a:prstGeom prst="rect">
+            <a:avLst/>
+          </a:prstGeom>
+          <a:noFill/>
+        </p:spPr>
+        <p:txBody>
+          <a:bodyPr wrap="none" rtlCol="0">
+            <a:spAutoFit/>
+          </a:bodyPr>
+          <a:lstStyle/>
+          <a:p>
+            <a:r>
+              <a:rPr lang="en-US" dirty="0"/>
+              <a:t>MQTT </a:t>
+            </a:r>
+            <a:r>
+              <a:rPr lang="en-US" dirty="0" err="1"/>
+              <a:t>Subcribe</a:t>
+            </a:r>
+            <a:endParaRPr lang="en-US" dirty="0"/>
+          </a:p>
+        </p:txBody>
+      </p:sp>
+      <p:cxnSp>
+        <p:nvCxnSpPr>
+          <p:cNvPr id="48" name="Straight Arrow Connector 47">
+            <a:extLst>
+              <a:ext uri="{FF2B5EF4-FFF2-40B4-BE49-F238E27FC236}">
+                <a16:creationId xmlns:a16="http://schemas.microsoft.com/office/drawing/2014/main" id="{94857FE9-6065-F14E-22D3-01E8BCDEEC52}"/>
+              </a:ext>
+            </a:extLst>
+          </p:cNvPr>
+          <p:cNvCxnSpPr>
+            <a:cxnSpLocks/>
+          </p:cNvCxnSpPr>
+          <p:nvPr/>
+        </p:nvCxnSpPr>
+        <p:spPr>
+          <a:xfrm flipV="1">
+            <a:off x="6767293" y="1138668"/>
+            <a:ext cx="1877421" cy="566362"/>
+          </a:xfrm>
+          <a:prstGeom prst="straightConnector1">
+            <a:avLst/>
+          </a:prstGeom>
+          <a:ln w="28575">
+            <a:tailEnd type="triangle"/>
+          </a:ln>
+        </p:spPr>
+        <p:style>
+          <a:lnRef idx="1">
+            <a:schemeClr val="dk1"/>
+          </a:lnRef>
+          <a:fillRef idx="0">
+            <a:schemeClr val="dk1"/>
+          </a:fillRef>
+          <a:effectRef idx="0">
+            <a:schemeClr val="dk1"/>
+          </a:effectRef>
+          <a:fontRef idx="minor">
+            <a:schemeClr val="tx1"/>
+          </a:fontRef>
+        </p:style>
+      </p:cxnSp>
+      <p:cxnSp>
+        <p:nvCxnSpPr>
+          <p:cNvPr id="49" name="Straight Arrow Connector 48">
+            <a:extLst>
+              <a:ext uri="{FF2B5EF4-FFF2-40B4-BE49-F238E27FC236}">
+                <a16:creationId xmlns:a16="http://schemas.microsoft.com/office/drawing/2014/main" id="{DA11D317-63F2-1EB2-7810-2CC03C7DED84}"/>
+              </a:ext>
+            </a:extLst>
+          </p:cNvPr>
+          <p:cNvCxnSpPr>
+            <a:cxnSpLocks/>
+          </p:cNvCxnSpPr>
+          <p:nvPr/>
+        </p:nvCxnSpPr>
+        <p:spPr>
+          <a:xfrm>
+            <a:off x="10494530" y="1542180"/>
+            <a:ext cx="24694" cy="2468880"/>
+          </a:xfrm>
+          <a:prstGeom prst="straightConnector1">
+            <a:avLst/>
+          </a:prstGeom>
+          <a:ln w="28575">
+            <a:tailEnd type="triangle"/>
+          </a:ln>
+        </p:spPr>
+        <p:style>
+          <a:lnRef idx="1">
+            <a:schemeClr val="dk1"/>
+          </a:lnRef>
+          <a:fillRef idx="0">
+            <a:schemeClr val="dk1"/>
+          </a:fillRef>
+          <a:effectRef idx="0">
+            <a:schemeClr val="dk1"/>
+          </a:effectRef>
+          <a:fontRef idx="minor">
+            <a:schemeClr val="tx1"/>
+          </a:fontRef>
+        </p:style>
+      </p:cxnSp>
+      <p:sp>
+        <p:nvSpPr>
+          <p:cNvPr id="59" name="TextBox 58">
+            <a:extLst>
+              <a:ext uri="{FF2B5EF4-FFF2-40B4-BE49-F238E27FC236}">
+                <a16:creationId xmlns:a16="http://schemas.microsoft.com/office/drawing/2014/main" id="{57DE22C3-41D4-3D1C-595E-C655FFFFBA50}"/>
+              </a:ext>
+            </a:extLst>
+          </p:cNvPr>
+          <p:cNvSpPr txBox="1"/>
+          <p:nvPr/>
+        </p:nvSpPr>
+        <p:spPr>
+          <a:xfrm rot="1170857">
+            <a:off x="3328696" y="1568090"/>
+            <a:ext cx="1554208" cy="369332"/>
+          </a:xfrm>
+          <a:prstGeom prst="rect">
+            <a:avLst/>
+          </a:prstGeom>
+          <a:noFill/>
+        </p:spPr>
+        <p:txBody>
+          <a:bodyPr wrap="none" rtlCol="0">
+            <a:spAutoFit/>
+          </a:bodyPr>
+          <a:lstStyle/>
+          <a:p>
+            <a:r>
+              <a:rPr lang="en-US" dirty="0"/>
+              <a:t>Direct Method</a:t>
+            </a:r>
+          </a:p>
+        </p:txBody>
+      </p:sp>
+      <p:sp>
+        <p:nvSpPr>
+          <p:cNvPr id="60" name="TextBox 59">
+            <a:extLst>
+              <a:ext uri="{FF2B5EF4-FFF2-40B4-BE49-F238E27FC236}">
+                <a16:creationId xmlns:a16="http://schemas.microsoft.com/office/drawing/2014/main" id="{408E2F58-6585-BEBC-DDC3-5CCEC74638FD}"/>
+              </a:ext>
+            </a:extLst>
+          </p:cNvPr>
+          <p:cNvSpPr txBox="1"/>
+          <p:nvPr/>
+        </p:nvSpPr>
+        <p:spPr>
+          <a:xfrm rot="20607580">
+            <a:off x="6721150" y="1103719"/>
+            <a:ext cx="1791644" cy="369332"/>
+          </a:xfrm>
+          <a:prstGeom prst="rect">
+            <a:avLst/>
+          </a:prstGeom>
+          <a:noFill/>
+        </p:spPr>
+        <p:txBody>
+          <a:bodyPr wrap="none" rtlCol="0">
+            <a:spAutoFit/>
+          </a:bodyPr>
+          <a:lstStyle/>
+          <a:p>
+            <a:r>
+              <a:rPr lang="en-US" dirty="0"/>
+              <a:t>Push Notification</a:t>
+            </a:r>
+          </a:p>
+        </p:txBody>
+      </p:sp>
+    </p:spTree>
+    <p:extLst>
+      <p:ext uri="{BB962C8B-B14F-4D97-AF65-F5344CB8AC3E}">
+        <p14:creationId xmlns:p14="http://schemas.microsoft.com/office/powerpoint/2010/main" val="1158799761"/>
       </p:ext>
     </p:extLst>
   </p:cSld>

</xml_diff>

<commit_message>
feat: add hardware block diagram
</commit_message>
<xml_diff>
--- a/General Architecture.pptx
+++ b/General Architecture.pptx
@@ -5,11 +5,12 @@
     <p:sldMasterId id="2147483648" r:id="rId1"/>
   </p:sldMasterIdLst>
   <p:notesMasterIdLst>
-    <p:notesMasterId r:id="rId4"/>
+    <p:notesMasterId r:id="rId5"/>
   </p:notesMasterIdLst>
   <p:sldIdLst>
     <p:sldId id="256" r:id="rId2"/>
     <p:sldId id="257" r:id="rId3"/>
+    <p:sldId id="258" r:id="rId4"/>
   </p:sldIdLst>
   <p:sldSz cx="12192000" cy="6858000"/>
   <p:notesSz cx="6858000" cy="9144000"/>
@@ -201,7 +202,7 @@
           <a:p>
             <a:fld id="{868DD910-6A72-4410-AA3C-D0D03B0B5661}" type="datetimeFigureOut">
               <a:rPr lang="en-US" smtClean="0"/>
-              <a:t>7/24/2023</a:t>
+              <a:t>7/27/2023</a:t>
             </a:fld>
             <a:endParaRPr lang="en-US"/>
           </a:p>
@@ -793,7 +794,7 @@
           <a:p>
             <a:fld id="{51B6C882-966F-4FDE-B016-98DDBE2D232C}" type="datetimeFigureOut">
               <a:rPr lang="en-US" smtClean="0"/>
-              <a:t>7/24/2023</a:t>
+              <a:t>7/27/2023</a:t>
             </a:fld>
             <a:endParaRPr lang="en-US"/>
           </a:p>
@@ -991,7 +992,7 @@
           <a:p>
             <a:fld id="{51B6C882-966F-4FDE-B016-98DDBE2D232C}" type="datetimeFigureOut">
               <a:rPr lang="en-US" smtClean="0"/>
-              <a:t>7/24/2023</a:t>
+              <a:t>7/27/2023</a:t>
             </a:fld>
             <a:endParaRPr lang="en-US"/>
           </a:p>
@@ -1199,7 +1200,7 @@
           <a:p>
             <a:fld id="{51B6C882-966F-4FDE-B016-98DDBE2D232C}" type="datetimeFigureOut">
               <a:rPr lang="en-US" smtClean="0"/>
-              <a:t>7/24/2023</a:t>
+              <a:t>7/27/2023</a:t>
             </a:fld>
             <a:endParaRPr lang="en-US"/>
           </a:p>
@@ -1397,7 +1398,7 @@
           <a:p>
             <a:fld id="{51B6C882-966F-4FDE-B016-98DDBE2D232C}" type="datetimeFigureOut">
               <a:rPr lang="en-US" smtClean="0"/>
-              <a:t>7/24/2023</a:t>
+              <a:t>7/27/2023</a:t>
             </a:fld>
             <a:endParaRPr lang="en-US"/>
           </a:p>
@@ -1672,7 +1673,7 @@
           <a:p>
             <a:fld id="{51B6C882-966F-4FDE-B016-98DDBE2D232C}" type="datetimeFigureOut">
               <a:rPr lang="en-US" smtClean="0"/>
-              <a:t>7/24/2023</a:t>
+              <a:t>7/27/2023</a:t>
             </a:fld>
             <a:endParaRPr lang="en-US"/>
           </a:p>
@@ -1937,7 +1938,7 @@
           <a:p>
             <a:fld id="{51B6C882-966F-4FDE-B016-98DDBE2D232C}" type="datetimeFigureOut">
               <a:rPr lang="en-US" smtClean="0"/>
-              <a:t>7/24/2023</a:t>
+              <a:t>7/27/2023</a:t>
             </a:fld>
             <a:endParaRPr lang="en-US"/>
           </a:p>
@@ -2349,7 +2350,7 @@
           <a:p>
             <a:fld id="{51B6C882-966F-4FDE-B016-98DDBE2D232C}" type="datetimeFigureOut">
               <a:rPr lang="en-US" smtClean="0"/>
-              <a:t>7/24/2023</a:t>
+              <a:t>7/27/2023</a:t>
             </a:fld>
             <a:endParaRPr lang="en-US"/>
           </a:p>
@@ -2490,7 +2491,7 @@
           <a:p>
             <a:fld id="{51B6C882-966F-4FDE-B016-98DDBE2D232C}" type="datetimeFigureOut">
               <a:rPr lang="en-US" smtClean="0"/>
-              <a:t>7/24/2023</a:t>
+              <a:t>7/27/2023</a:t>
             </a:fld>
             <a:endParaRPr lang="en-US"/>
           </a:p>
@@ -2603,7 +2604,7 @@
           <a:p>
             <a:fld id="{51B6C882-966F-4FDE-B016-98DDBE2D232C}" type="datetimeFigureOut">
               <a:rPr lang="en-US" smtClean="0"/>
-              <a:t>7/24/2023</a:t>
+              <a:t>7/27/2023</a:t>
             </a:fld>
             <a:endParaRPr lang="en-US"/>
           </a:p>
@@ -2914,7 +2915,7 @@
           <a:p>
             <a:fld id="{51B6C882-966F-4FDE-B016-98DDBE2D232C}" type="datetimeFigureOut">
               <a:rPr lang="en-US" smtClean="0"/>
-              <a:t>7/24/2023</a:t>
+              <a:t>7/27/2023</a:t>
             </a:fld>
             <a:endParaRPr lang="en-US"/>
           </a:p>
@@ -3202,7 +3203,7 @@
           <a:p>
             <a:fld id="{51B6C882-966F-4FDE-B016-98DDBE2D232C}" type="datetimeFigureOut">
               <a:rPr lang="en-US" smtClean="0"/>
-              <a:t>7/24/2023</a:t>
+              <a:t>7/27/2023</a:t>
             </a:fld>
             <a:endParaRPr lang="en-US"/>
           </a:p>
@@ -3443,7 +3444,7 @@
           <a:p>
             <a:fld id="{51B6C882-966F-4FDE-B016-98DDBE2D232C}" type="datetimeFigureOut">
               <a:rPr lang="en-US" smtClean="0"/>
-              <a:t>7/24/2023</a:t>
+              <a:t>7/27/2023</a:t>
             </a:fld>
             <a:endParaRPr lang="en-US"/>
           </a:p>
@@ -4170,7 +4171,7 @@
           <a:lstStyle/>
           <a:p>
             <a:r>
-              <a:rPr lang="en-US" sz="2400" b="1" dirty="0"/>
+              <a:rPr lang="en-US" sz="2400" b="1"/>
               <a:t>Server</a:t>
             </a:r>
           </a:p>
@@ -4205,7 +4206,7 @@
           <a:lstStyle/>
           <a:p>
             <a:r>
-              <a:rPr lang="en-US" sz="2400" b="1" dirty="0"/>
+              <a:rPr lang="en-US" sz="2400" b="1"/>
               <a:t>Robot</a:t>
             </a:r>
           </a:p>
@@ -4240,7 +4241,7 @@
           <a:lstStyle/>
           <a:p>
             <a:r>
-              <a:rPr lang="en-US" sz="2400" b="1" dirty="0"/>
+              <a:rPr lang="en-US" sz="2400" b="1"/>
               <a:t>App</a:t>
             </a:r>
           </a:p>
@@ -4586,7 +4587,7 @@
           <a:lstStyle/>
           <a:p>
             <a:r>
-              <a:rPr lang="en-US" sz="2400" b="1" dirty="0"/>
+              <a:rPr lang="en-US" sz="2400" b="1"/>
               <a:t>Server</a:t>
             </a:r>
           </a:p>
@@ -4621,7 +4622,7 @@
           <a:lstStyle/>
           <a:p>
             <a:r>
-              <a:rPr lang="en-US" sz="2400" b="1" dirty="0"/>
+              <a:rPr lang="en-US" sz="2400" b="1"/>
               <a:t>Robot</a:t>
             </a:r>
           </a:p>
@@ -4656,7 +4657,7 @@
           <a:lstStyle/>
           <a:p>
             <a:r>
-              <a:rPr lang="en-US" sz="2400" b="1" dirty="0"/>
+              <a:rPr lang="en-US" sz="2400" b="1"/>
               <a:t>App</a:t>
             </a:r>
           </a:p>
@@ -4691,7 +4692,7 @@
           <a:lstStyle/>
           <a:p>
             <a:r>
-              <a:rPr lang="en-US" dirty="0"/>
+              <a:rPr lang="en-US"/>
               <a:t>HTTP Request</a:t>
             </a:r>
           </a:p>
@@ -4726,7 +4727,7 @@
           <a:lstStyle/>
           <a:p>
             <a:r>
-              <a:rPr lang="en-US" dirty="0"/>
+              <a:rPr lang="en-US"/>
               <a:t>Response</a:t>
             </a:r>
           </a:p>
@@ -4774,7 +4775,7 @@
           <a:p>
             <a:pPr algn="ctr"/>
             <a:r>
-              <a:rPr lang="en-US" sz="2400" dirty="0"/>
+              <a:rPr lang="en-US" sz="2400"/>
               <a:t>Azure IoT Hub</a:t>
             </a:r>
           </a:p>
@@ -4849,7 +4850,7 @@
           <a:p>
             <a:pPr algn="ctr"/>
             <a:r>
-              <a:rPr lang="en-US" dirty="0"/>
+              <a:rPr lang="en-US"/>
               <a:t>Firebase Cloud Messaging</a:t>
             </a:r>
           </a:p>
@@ -4964,7 +4965,7 @@
           <a:lstStyle/>
           <a:p>
             <a:r>
-              <a:rPr lang="en-US" dirty="0"/>
+              <a:rPr lang="en-US"/>
               <a:t>HTTP Request</a:t>
             </a:r>
           </a:p>
@@ -4999,7 +5000,7 @@
           <a:lstStyle/>
           <a:p>
             <a:r>
-              <a:rPr lang="en-US" dirty="0"/>
+              <a:rPr lang="en-US"/>
               <a:t>Response</a:t>
             </a:r>
           </a:p>
@@ -5034,7 +5035,7 @@
           <a:lstStyle/>
           <a:p>
             <a:r>
-              <a:rPr lang="en-US" dirty="0"/>
+              <a:rPr lang="en-US"/>
               <a:t>MQTT Publish</a:t>
             </a:r>
           </a:p>
@@ -5149,14 +5150,14 @@
           <a:lstStyle/>
           <a:p>
             <a:r>
-              <a:rPr lang="en-US" dirty="0"/>
+              <a:rPr lang="en-US"/>
               <a:t>MQTT </a:t>
             </a:r>
             <a:r>
-              <a:rPr lang="en-US" dirty="0" err="1"/>
+              <a:rPr lang="en-US" err="1"/>
               <a:t>Subcribe</a:t>
             </a:r>
-            <a:endParaRPr lang="en-US" dirty="0"/>
+            <a:endParaRPr lang="en-US"/>
           </a:p>
         </p:txBody>
       </p:sp>
@@ -5271,7 +5272,7 @@
           <a:lstStyle/>
           <a:p>
             <a:r>
-              <a:rPr lang="en-US" dirty="0"/>
+              <a:rPr lang="en-US"/>
               <a:t>Direct Method</a:t>
             </a:r>
           </a:p>
@@ -5306,7 +5307,7 @@
           <a:lstStyle/>
           <a:p>
             <a:r>
-              <a:rPr lang="en-US" dirty="0"/>
+              <a:rPr lang="en-US"/>
               <a:t>Push Notification</a:t>
             </a:r>
           </a:p>
@@ -5316,6 +5317,385 @@
     <p:extLst>
       <p:ext uri="{BB962C8B-B14F-4D97-AF65-F5344CB8AC3E}">
         <p14:creationId xmlns:p14="http://schemas.microsoft.com/office/powerpoint/2010/main" val="1158799761"/>
+      </p:ext>
+    </p:extLst>
+  </p:cSld>
+  <p:clrMapOvr>
+    <a:masterClrMapping/>
+  </p:clrMapOvr>
+</p:sld>
+</file>
+
+<file path=ppt/slides/slide3.xml><?xml version="1.0" encoding="utf-8"?>
+<p:sld xmlns:a="http://schemas.openxmlformats.org/drawingml/2006/main" xmlns:r="http://schemas.openxmlformats.org/officeDocument/2006/relationships" xmlns:p="http://schemas.openxmlformats.org/presentationml/2006/main">
+  <p:cSld>
+    <p:spTree>
+      <p:nvGrpSpPr>
+        <p:cNvPr id="1" name=""/>
+        <p:cNvGrpSpPr/>
+        <p:nvPr/>
+      </p:nvGrpSpPr>
+      <p:grpSpPr>
+        <a:xfrm>
+          <a:off x="0" y="0"/>
+          <a:ext cx="0" cy="0"/>
+          <a:chOff x="0" y="0"/>
+          <a:chExt cx="0" cy="0"/>
+        </a:xfrm>
+      </p:grpSpPr>
+      <p:sp>
+        <p:nvSpPr>
+          <p:cNvPr id="4" name="Rectangle 3">
+            <a:extLst>
+              <a:ext uri="{FF2B5EF4-FFF2-40B4-BE49-F238E27FC236}">
+                <a16:creationId xmlns:a16="http://schemas.microsoft.com/office/drawing/2014/main" id="{9ABD928D-15EA-8C16-554C-41C3C09934F0}"/>
+              </a:ext>
+            </a:extLst>
+          </p:cNvPr>
+          <p:cNvSpPr/>
+          <p:nvPr/>
+        </p:nvSpPr>
+        <p:spPr>
+          <a:xfrm>
+            <a:off x="3639982" y="2326293"/>
+            <a:ext cx="2157369" cy="991997"/>
+          </a:xfrm>
+          <a:prstGeom prst="rect">
+            <a:avLst/>
+          </a:prstGeom>
+          <a:ln w="28575"/>
+        </p:spPr>
+        <p:style>
+          <a:lnRef idx="2">
+            <a:schemeClr val="dk1"/>
+          </a:lnRef>
+          <a:fillRef idx="1">
+            <a:schemeClr val="lt1"/>
+          </a:fillRef>
+          <a:effectRef idx="0">
+            <a:schemeClr val="dk1"/>
+          </a:effectRef>
+          <a:fontRef idx="minor">
+            <a:schemeClr val="dk1"/>
+          </a:fontRef>
+        </p:style>
+        <p:txBody>
+          <a:bodyPr rtlCol="0" anchor="ctr"/>
+          <a:lstStyle/>
+          <a:p>
+            <a:pPr algn="ctr"/>
+            <a:r>
+              <a:rPr lang="en-US" sz="2400" b="1"/>
+              <a:t>Mainboard</a:t>
+            </a:r>
+          </a:p>
+        </p:txBody>
+      </p:sp>
+      <p:sp>
+        <p:nvSpPr>
+          <p:cNvPr id="5" name="Rectangle 4">
+            <a:extLst>
+              <a:ext uri="{FF2B5EF4-FFF2-40B4-BE49-F238E27FC236}">
+                <a16:creationId xmlns:a16="http://schemas.microsoft.com/office/drawing/2014/main" id="{176237F4-2985-4779-1166-A9A1FD8506A8}"/>
+              </a:ext>
+            </a:extLst>
+          </p:cNvPr>
+          <p:cNvSpPr/>
+          <p:nvPr/>
+        </p:nvSpPr>
+        <p:spPr>
+          <a:xfrm>
+            <a:off x="497725" y="1667733"/>
+            <a:ext cx="1784000" cy="707168"/>
+          </a:xfrm>
+          <a:prstGeom prst="rect">
+            <a:avLst/>
+          </a:prstGeom>
+          <a:ln w="28575"/>
+        </p:spPr>
+        <p:style>
+          <a:lnRef idx="2">
+            <a:schemeClr val="dk1"/>
+          </a:lnRef>
+          <a:fillRef idx="1">
+            <a:schemeClr val="lt1"/>
+          </a:fillRef>
+          <a:effectRef idx="0">
+            <a:schemeClr val="dk1"/>
+          </a:effectRef>
+          <a:fontRef idx="minor">
+            <a:schemeClr val="dk1"/>
+          </a:fontRef>
+        </p:style>
+        <p:txBody>
+          <a:bodyPr rtlCol="0" anchor="ctr"/>
+          <a:lstStyle/>
+          <a:p>
+            <a:pPr algn="ctr"/>
+            <a:r>
+              <a:rPr lang="en-US" sz="2400" b="1"/>
+              <a:t>Cảm biến khí gas</a:t>
+            </a:r>
+          </a:p>
+        </p:txBody>
+      </p:sp>
+      <p:sp>
+        <p:nvSpPr>
+          <p:cNvPr id="6" name="Rectangle 5">
+            <a:extLst>
+              <a:ext uri="{FF2B5EF4-FFF2-40B4-BE49-F238E27FC236}">
+                <a16:creationId xmlns:a16="http://schemas.microsoft.com/office/drawing/2014/main" id="{91088976-0872-D662-E078-B07EC5E10987}"/>
+              </a:ext>
+            </a:extLst>
+          </p:cNvPr>
+          <p:cNvSpPr/>
+          <p:nvPr/>
+        </p:nvSpPr>
+        <p:spPr>
+          <a:xfrm>
+            <a:off x="497725" y="3219264"/>
+            <a:ext cx="1784000" cy="707168"/>
+          </a:xfrm>
+          <a:prstGeom prst="rect">
+            <a:avLst/>
+          </a:prstGeom>
+          <a:ln w="28575"/>
+        </p:spPr>
+        <p:style>
+          <a:lnRef idx="2">
+            <a:schemeClr val="dk1"/>
+          </a:lnRef>
+          <a:fillRef idx="1">
+            <a:schemeClr val="lt1"/>
+          </a:fillRef>
+          <a:effectRef idx="0">
+            <a:schemeClr val="dk1"/>
+          </a:effectRef>
+          <a:fontRef idx="minor">
+            <a:schemeClr val="dk1"/>
+          </a:fontRef>
+        </p:style>
+        <p:txBody>
+          <a:bodyPr rtlCol="0" anchor="ctr"/>
+          <a:lstStyle/>
+          <a:p>
+            <a:pPr algn="ctr"/>
+            <a:r>
+              <a:rPr lang="en-US" sz="2400" b="1"/>
+              <a:t>Cảm biến siêu âm</a:t>
+            </a:r>
+          </a:p>
+        </p:txBody>
+      </p:sp>
+      <p:sp>
+        <p:nvSpPr>
+          <p:cNvPr id="7" name="Rectangle 6">
+            <a:extLst>
+              <a:ext uri="{FF2B5EF4-FFF2-40B4-BE49-F238E27FC236}">
+                <a16:creationId xmlns:a16="http://schemas.microsoft.com/office/drawing/2014/main" id="{4AB0107C-0530-6504-F6B4-BA6C96F23208}"/>
+              </a:ext>
+            </a:extLst>
+          </p:cNvPr>
+          <p:cNvSpPr/>
+          <p:nvPr/>
+        </p:nvSpPr>
+        <p:spPr>
+          <a:xfrm>
+            <a:off x="7027131" y="3926432"/>
+            <a:ext cx="2218469" cy="1067498"/>
+          </a:xfrm>
+          <a:prstGeom prst="rect">
+            <a:avLst/>
+          </a:prstGeom>
+          <a:ln w="28575"/>
+        </p:spPr>
+        <p:style>
+          <a:lnRef idx="2">
+            <a:schemeClr val="dk1"/>
+          </a:lnRef>
+          <a:fillRef idx="1">
+            <a:schemeClr val="lt1"/>
+          </a:fillRef>
+          <a:effectRef idx="0">
+            <a:schemeClr val="dk1"/>
+          </a:effectRef>
+          <a:fontRef idx="minor">
+            <a:schemeClr val="dk1"/>
+          </a:fontRef>
+        </p:style>
+        <p:txBody>
+          <a:bodyPr rtlCol="0" anchor="ctr"/>
+          <a:lstStyle/>
+          <a:p>
+            <a:pPr algn="ctr"/>
+            <a:r>
+              <a:rPr lang="en-US" sz="2400" b="1"/>
+              <a:t>Nguồn pin</a:t>
+            </a:r>
+          </a:p>
+        </p:txBody>
+      </p:sp>
+      <p:sp>
+        <p:nvSpPr>
+          <p:cNvPr id="8" name="Rectangle 7">
+            <a:extLst>
+              <a:ext uri="{FF2B5EF4-FFF2-40B4-BE49-F238E27FC236}">
+                <a16:creationId xmlns:a16="http://schemas.microsoft.com/office/drawing/2014/main" id="{7D6CC0E7-51D5-D09F-C137-7E484AC0EE20}"/>
+              </a:ext>
+            </a:extLst>
+          </p:cNvPr>
+          <p:cNvSpPr/>
+          <p:nvPr/>
+        </p:nvSpPr>
+        <p:spPr>
+          <a:xfrm>
+            <a:off x="3639982" y="3926432"/>
+            <a:ext cx="2448408" cy="1067498"/>
+          </a:xfrm>
+          <a:prstGeom prst="rect">
+            <a:avLst/>
+          </a:prstGeom>
+          <a:ln w="28575"/>
+        </p:spPr>
+        <p:style>
+          <a:lnRef idx="2">
+            <a:schemeClr val="dk1"/>
+          </a:lnRef>
+          <a:fillRef idx="1">
+            <a:schemeClr val="lt1"/>
+          </a:fillRef>
+          <a:effectRef idx="0">
+            <a:schemeClr val="dk1"/>
+          </a:effectRef>
+          <a:fontRef idx="minor">
+            <a:schemeClr val="dk1"/>
+          </a:fontRef>
+        </p:style>
+        <p:txBody>
+          <a:bodyPr rtlCol="0" anchor="ctr"/>
+          <a:lstStyle/>
+          <a:p>
+            <a:pPr algn="ctr"/>
+            <a:r>
+              <a:rPr lang="en-US" sz="2400" b="1"/>
+              <a:t>Module </a:t>
+            </a:r>
+            <a:r>
+              <a:rPr lang="en-US" sz="2400" b="1" err="1"/>
+              <a:t>hạ</a:t>
+            </a:r>
+            <a:r>
+              <a:rPr lang="en-US" sz="2400" b="1"/>
+              <a:t> </a:t>
+            </a:r>
+            <a:r>
+              <a:rPr lang="en-US" sz="2400" b="1" err="1"/>
+              <a:t>áp</a:t>
+            </a:r>
+            <a:endParaRPr lang="en-US" sz="2400" b="1"/>
+          </a:p>
+        </p:txBody>
+      </p:sp>
+      <p:sp>
+        <p:nvSpPr>
+          <p:cNvPr id="12" name="Rectangle 11">
+            <a:extLst>
+              <a:ext uri="{FF2B5EF4-FFF2-40B4-BE49-F238E27FC236}">
+                <a16:creationId xmlns:a16="http://schemas.microsoft.com/office/drawing/2014/main" id="{24D91F71-7E32-A026-8A60-EF6177962588}"/>
+              </a:ext>
+            </a:extLst>
+          </p:cNvPr>
+          <p:cNvSpPr/>
+          <p:nvPr/>
+        </p:nvSpPr>
+        <p:spPr>
+          <a:xfrm>
+            <a:off x="6618587" y="986491"/>
+            <a:ext cx="2448408" cy="1067498"/>
+          </a:xfrm>
+          <a:prstGeom prst="rect">
+            <a:avLst/>
+          </a:prstGeom>
+          <a:ln w="28575"/>
+        </p:spPr>
+        <p:style>
+          <a:lnRef idx="2">
+            <a:schemeClr val="dk1"/>
+          </a:lnRef>
+          <a:fillRef idx="1">
+            <a:schemeClr val="lt1"/>
+          </a:fillRef>
+          <a:effectRef idx="0">
+            <a:schemeClr val="dk1"/>
+          </a:effectRef>
+          <a:fontRef idx="minor">
+            <a:schemeClr val="dk1"/>
+          </a:fontRef>
+        </p:style>
+        <p:txBody>
+          <a:bodyPr rtlCol="0" anchor="ctr"/>
+          <a:lstStyle/>
+          <a:p>
+            <a:pPr algn="ctr"/>
+            <a:r>
+              <a:rPr lang="en-US" sz="2400" b="1"/>
+              <a:t>Module điều khiển động cơ</a:t>
+            </a:r>
+          </a:p>
+        </p:txBody>
+      </p:sp>
+      <p:sp>
+        <p:nvSpPr>
+          <p:cNvPr id="14" name="Rectangle 13">
+            <a:extLst>
+              <a:ext uri="{FF2B5EF4-FFF2-40B4-BE49-F238E27FC236}">
+                <a16:creationId xmlns:a16="http://schemas.microsoft.com/office/drawing/2014/main" id="{149910A3-CBFC-4FA3-6B89-DCE05FB84D66}"/>
+              </a:ext>
+            </a:extLst>
+          </p:cNvPr>
+          <p:cNvSpPr/>
+          <p:nvPr/>
+        </p:nvSpPr>
+        <p:spPr>
+          <a:xfrm>
+            <a:off x="9570872" y="986491"/>
+            <a:ext cx="2448408" cy="1067498"/>
+          </a:xfrm>
+          <a:prstGeom prst="rect">
+            <a:avLst/>
+          </a:prstGeom>
+          <a:ln w="28575"/>
+        </p:spPr>
+        <p:style>
+          <a:lnRef idx="2">
+            <a:schemeClr val="dk1"/>
+          </a:lnRef>
+          <a:fillRef idx="1">
+            <a:schemeClr val="lt1"/>
+          </a:fillRef>
+          <a:effectRef idx="0">
+            <a:schemeClr val="dk1"/>
+          </a:effectRef>
+          <a:fontRef idx="minor">
+            <a:schemeClr val="dk1"/>
+          </a:fontRef>
+        </p:style>
+        <p:txBody>
+          <a:bodyPr rtlCol="0" anchor="ctr"/>
+          <a:lstStyle/>
+          <a:p>
+            <a:pPr algn="ctr"/>
+            <a:r>
+              <a:rPr lang="en-US" sz="2400" b="1"/>
+              <a:t>Động cơ điện</a:t>
+            </a:r>
+          </a:p>
+        </p:txBody>
+      </p:sp>
+    </p:spTree>
+    <p:extLst>
+      <p:ext uri="{BB962C8B-B14F-4D97-AF65-F5344CB8AC3E}">
+        <p14:creationId xmlns:p14="http://schemas.microsoft.com/office/powerpoint/2010/main" val="467710331"/>
       </p:ext>
     </p:extLst>
   </p:cSld>

</xml_diff>